<commit_message>
feat: enhance Bible verses presentation script with JSON data loading and command line interface
</commit_message>
<xml_diff>
--- a/Bible_Verses_Collection.pptx
+++ b/Bible_Verses_Collection.pptx
@@ -19,17 +19,6 @@
     <p:sldId id="267" r:id="rId18"/>
     <p:sldId id="268" r:id="rId19"/>
     <p:sldId id="269" r:id="rId20"/>
-    <p:sldId id="270" r:id="rId21"/>
-    <p:sldId id="271" r:id="rId22"/>
-    <p:sldId id="272" r:id="rId23"/>
-    <p:sldId id="273" r:id="rId24"/>
-    <p:sldId id="274" r:id="rId25"/>
-    <p:sldId id="275" r:id="rId26"/>
-    <p:sldId id="276" r:id="rId27"/>
-    <p:sldId id="277" r:id="rId28"/>
-    <p:sldId id="278" r:id="rId29"/>
-    <p:sldId id="279" r:id="rId30"/>
-    <p:sldId id="280" r:id="rId31"/>
   </p:sldIdLst>
   <p:sldSz cx="9144000" cy="6858000" type="screen4x3"/>
   <p:notesSz cx="6858000" cy="9144000"/>
@@ -3219,7 +3208,7 @@
               </a:defRPr>
             </a:pPr>
             <a:r>
-              <a:t>Deuteronomy 28:1</a:t>
+              <a:t>Romans 4:13–14 (KJV) (Part 2/2)</a:t>
             </a:r>
           </a:p>
         </p:txBody>
@@ -3254,7 +3243,7 @@
               </a:defRPr>
             </a:pPr>
             <a:r>
-              <a:t>"If you fully obey the Lord your God and carefully follow all his commands I give you today, the Lord your God will set you high above all the nations on earth."</a:t>
+              <a:t>"For if they which are of the law be heirs, faith is made void, and the promise made of none effect:"</a:t>
             </a:r>
           </a:p>
         </p:txBody>
@@ -3324,7 +3313,7 @@
               </a:defRPr>
             </a:pPr>
             <a:r>
-              <a:t>Deuteronomy 28:15</a:t>
+              <a:t>Galatians 3:29 (KJV)</a:t>
             </a:r>
           </a:p>
         </p:txBody>
@@ -3359,7 +3348,7 @@
               </a:defRPr>
             </a:pPr>
             <a:r>
-              <a:t>"However, if you do not obey the Lord your God and do not carefully follow all his commands and decrees I am giving you today, all these curses will come on you and overtake you:"</a:t>
+              <a:t>"And if ye be Christ's, then are ye Abraham's seed, and heirs according to the promise."</a:t>
             </a:r>
           </a:p>
         </p:txBody>
@@ -3429,7 +3418,7 @@
               </a:defRPr>
             </a:pPr>
             <a:r>
-              <a:t>Deuteronomy 28:68 (Part 1/2)</a:t>
+              <a:t>Romans 5:19 (KJV)</a:t>
             </a:r>
           </a:p>
         </p:txBody>
@@ -3464,7 +3453,7 @@
               </a:defRPr>
             </a:pPr>
             <a:r>
-              <a:t>"The Lord will send you back in ships to Egypt on a journey I said you should never make again."</a:t>
+              <a:t>"For as by one man's disobedience many were made sinners, so by the obedience of one shall many be made righteous."</a:t>
             </a:r>
           </a:p>
         </p:txBody>
@@ -3534,7 +3523,7 @@
               </a:defRPr>
             </a:pPr>
             <a:r>
-              <a:t>Deuteronomy 28:68 (Part 2/2)</a:t>
+              <a:t>2 Corinthians 5:21 (KJV)</a:t>
             </a:r>
           </a:p>
         </p:txBody>
@@ -3569,7 +3558,7 @@
               </a:defRPr>
             </a:pPr>
             <a:r>
-              <a:t>"There you will offer yourselves for sale to your enemies as male and female slaves, but no one will buy you."</a:t>
+              <a:t>"For he hath made him to be sin for us, who knew no sin; that we might be made the righteousness of God in him."</a:t>
             </a:r>
           </a:p>
         </p:txBody>
@@ -3639,7 +3628,7 @@
               </a:defRPr>
             </a:pPr>
             <a:r>
-              <a:t>Psalm 109:17</a:t>
+              <a:t>Galatians 5:4 (KJV)</a:t>
             </a:r>
           </a:p>
         </p:txBody>
@@ -3674,532 +3663,7 @@
               </a:defRPr>
             </a:pPr>
             <a:r>
-              <a:t>"He loved to pronounce a curse—may it come back on him. He found no pleasure in blessing—may it be far from him."</a:t>
-            </a:r>
-          </a:p>
-        </p:txBody>
-      </p:sp>
-    </p:spTree>
-  </p:cSld>
-  <p:clrMapOvr>
-    <a:masterClrMapping/>
-  </p:clrMapOvr>
-</p:sld>
-</file>
-
-<file path=ppt/slides/slide15.xml><?xml version="1.0" encoding="utf-8"?>
-<p:sld xmlns:a="http://schemas.openxmlformats.org/drawingml/2006/main" xmlns:p="http://schemas.openxmlformats.org/presentationml/2006/main" xmlns:r="http://schemas.openxmlformats.org/officeDocument/2006/relationships">
-  <p:cSld>
-    <p:spTree>
-      <p:nvGrpSpPr>
-        <p:cNvPr id="1" name=""/>
-        <p:cNvGrpSpPr/>
-        <p:nvPr/>
-      </p:nvGrpSpPr>
-      <p:grpSpPr/>
-      <p:sp>
-        <p:nvSpPr>
-          <p:cNvPr id="2" name="Title 1"/>
-          <p:cNvSpPr>
-            <a:spLocks noGrp="1"/>
-          </p:cNvSpPr>
-          <p:nvPr>
-            <p:ph type="title"/>
-          </p:nvPr>
-        </p:nvSpPr>
-        <p:spPr/>
-        <p:txBody>
-          <a:bodyPr/>
-          <a:lstStyle/>
-          <a:p/>
-        </p:txBody>
-      </p:sp>
-      <p:sp>
-        <p:nvSpPr>
-          <p:cNvPr id="3" name="TextBox 2"/>
-          <p:cNvSpPr txBox="1"/>
-          <p:nvPr/>
-        </p:nvSpPr>
-        <p:spPr>
-          <a:xfrm>
-            <a:off x="914400" y="914400"/>
-            <a:ext cx="7315200" cy="914400"/>
-          </a:xfrm>
-          <a:prstGeom prst="rect">
-            <a:avLst/>
-          </a:prstGeom>
-          <a:noFill/>
-        </p:spPr>
-        <p:txBody>
-          <a:bodyPr wrap="none">
-            <a:spAutoFit/>
-          </a:bodyPr>
-          <a:lstStyle/>
-          <a:p>
-            <a:pPr algn="ctr">
-              <a:defRPr sz="2800" b="1">
-                <a:solidFill>
-                  <a:srgbClr val="003366"/>
-                </a:solidFill>
-              </a:defRPr>
-            </a:pPr>
-            <a:r>
-              <a:t>Genesis 13:15</a:t>
-            </a:r>
-          </a:p>
-        </p:txBody>
-      </p:sp>
-      <p:sp>
-        <p:nvSpPr>
-          <p:cNvPr id="4" name="TextBox 3"/>
-          <p:cNvSpPr txBox="1"/>
-          <p:nvPr/>
-        </p:nvSpPr>
-        <p:spPr>
-          <a:xfrm>
-            <a:off x="914400" y="2286000"/>
-            <a:ext cx="7315200" cy="3657600"/>
-          </a:xfrm>
-          <a:prstGeom prst="rect">
-            <a:avLst/>
-          </a:prstGeom>
-          <a:noFill/>
-        </p:spPr>
-        <p:txBody>
-          <a:bodyPr wrap="square">
-            <a:spAutoFit/>
-          </a:bodyPr>
-          <a:lstStyle/>
-          <a:p>
-            <a:pPr algn="ctr">
-              <a:defRPr sz="4000">
-                <a:solidFill>
-                  <a:srgbClr val="333333"/>
-                </a:solidFill>
-              </a:defRPr>
-            </a:pPr>
-            <a:r>
-              <a:t>"All the land that you see I will give to you and your offspring forever."</a:t>
-            </a:r>
-          </a:p>
-        </p:txBody>
-      </p:sp>
-    </p:spTree>
-  </p:cSld>
-  <p:clrMapOvr>
-    <a:masterClrMapping/>
-  </p:clrMapOvr>
-</p:sld>
-</file>
-
-<file path=ppt/slides/slide16.xml><?xml version="1.0" encoding="utf-8"?>
-<p:sld xmlns:a="http://schemas.openxmlformats.org/drawingml/2006/main" xmlns:p="http://schemas.openxmlformats.org/presentationml/2006/main" xmlns:r="http://schemas.openxmlformats.org/officeDocument/2006/relationships">
-  <p:cSld>
-    <p:spTree>
-      <p:nvGrpSpPr>
-        <p:cNvPr id="1" name=""/>
-        <p:cNvGrpSpPr/>
-        <p:nvPr/>
-      </p:nvGrpSpPr>
-      <p:grpSpPr/>
-      <p:sp>
-        <p:nvSpPr>
-          <p:cNvPr id="2" name="Title 1"/>
-          <p:cNvSpPr>
-            <a:spLocks noGrp="1"/>
-          </p:cNvSpPr>
-          <p:nvPr>
-            <p:ph type="title"/>
-          </p:nvPr>
-        </p:nvSpPr>
-        <p:spPr/>
-        <p:txBody>
-          <a:bodyPr/>
-          <a:lstStyle/>
-          <a:p/>
-        </p:txBody>
-      </p:sp>
-      <p:sp>
-        <p:nvSpPr>
-          <p:cNvPr id="3" name="TextBox 2"/>
-          <p:cNvSpPr txBox="1"/>
-          <p:nvPr/>
-        </p:nvSpPr>
-        <p:spPr>
-          <a:xfrm>
-            <a:off x="914400" y="914400"/>
-            <a:ext cx="7315200" cy="914400"/>
-          </a:xfrm>
-          <a:prstGeom prst="rect">
-            <a:avLst/>
-          </a:prstGeom>
-          <a:noFill/>
-        </p:spPr>
-        <p:txBody>
-          <a:bodyPr wrap="none">
-            <a:spAutoFit/>
-          </a:bodyPr>
-          <a:lstStyle/>
-          <a:p>
-            <a:pPr algn="ctr">
-              <a:defRPr sz="2800" b="1">
-                <a:solidFill>
-                  <a:srgbClr val="003366"/>
-                </a:solidFill>
-              </a:defRPr>
-            </a:pPr>
-            <a:r>
-              <a:t>Joshua 1:3</a:t>
-            </a:r>
-          </a:p>
-        </p:txBody>
-      </p:sp>
-      <p:sp>
-        <p:nvSpPr>
-          <p:cNvPr id="4" name="TextBox 3"/>
-          <p:cNvSpPr txBox="1"/>
-          <p:nvPr/>
-        </p:nvSpPr>
-        <p:spPr>
-          <a:xfrm>
-            <a:off x="914400" y="2286000"/>
-            <a:ext cx="7315200" cy="3657600"/>
-          </a:xfrm>
-          <a:prstGeom prst="rect">
-            <a:avLst/>
-          </a:prstGeom>
-          <a:noFill/>
-        </p:spPr>
-        <p:txBody>
-          <a:bodyPr wrap="square">
-            <a:spAutoFit/>
-          </a:bodyPr>
-          <a:lstStyle/>
-          <a:p>
-            <a:pPr algn="ctr">
-              <a:defRPr sz="4000">
-                <a:solidFill>
-                  <a:srgbClr val="333333"/>
-                </a:solidFill>
-              </a:defRPr>
-            </a:pPr>
-            <a:r>
-              <a:t>"I will give you every place where you set your foot, as I promised Moses."</a:t>
-            </a:r>
-          </a:p>
-        </p:txBody>
-      </p:sp>
-    </p:spTree>
-  </p:cSld>
-  <p:clrMapOvr>
-    <a:masterClrMapping/>
-  </p:clrMapOvr>
-</p:sld>
-</file>
-
-<file path=ppt/slides/slide17.xml><?xml version="1.0" encoding="utf-8"?>
-<p:sld xmlns:a="http://schemas.openxmlformats.org/drawingml/2006/main" xmlns:p="http://schemas.openxmlformats.org/presentationml/2006/main" xmlns:r="http://schemas.openxmlformats.org/officeDocument/2006/relationships">
-  <p:cSld>
-    <p:spTree>
-      <p:nvGrpSpPr>
-        <p:cNvPr id="1" name=""/>
-        <p:cNvGrpSpPr/>
-        <p:nvPr/>
-      </p:nvGrpSpPr>
-      <p:grpSpPr/>
-      <p:sp>
-        <p:nvSpPr>
-          <p:cNvPr id="2" name="Title 1"/>
-          <p:cNvSpPr>
-            <a:spLocks noGrp="1"/>
-          </p:cNvSpPr>
-          <p:nvPr>
-            <p:ph type="title"/>
-          </p:nvPr>
-        </p:nvSpPr>
-        <p:spPr/>
-        <p:txBody>
-          <a:bodyPr/>
-          <a:lstStyle/>
-          <a:p/>
-        </p:txBody>
-      </p:sp>
-      <p:sp>
-        <p:nvSpPr>
-          <p:cNvPr id="3" name="TextBox 2"/>
-          <p:cNvSpPr txBox="1"/>
-          <p:nvPr/>
-        </p:nvSpPr>
-        <p:spPr>
-          <a:xfrm>
-            <a:off x="914400" y="914400"/>
-            <a:ext cx="7315200" cy="914400"/>
-          </a:xfrm>
-          <a:prstGeom prst="rect">
-            <a:avLst/>
-          </a:prstGeom>
-          <a:noFill/>
-        </p:spPr>
-        <p:txBody>
-          <a:bodyPr wrap="none">
-            <a:spAutoFit/>
-          </a:bodyPr>
-          <a:lstStyle/>
-          <a:p>
-            <a:pPr algn="ctr">
-              <a:defRPr sz="2800" b="1">
-                <a:solidFill>
-                  <a:srgbClr val="003366"/>
-                </a:solidFill>
-              </a:defRPr>
-            </a:pPr>
-            <a:r>
-              <a:t>Genesis 3:7</a:t>
-            </a:r>
-          </a:p>
-        </p:txBody>
-      </p:sp>
-      <p:sp>
-        <p:nvSpPr>
-          <p:cNvPr id="4" name="TextBox 3"/>
-          <p:cNvSpPr txBox="1"/>
-          <p:nvPr/>
-        </p:nvSpPr>
-        <p:spPr>
-          <a:xfrm>
-            <a:off x="914400" y="2286000"/>
-            <a:ext cx="7315200" cy="3657600"/>
-          </a:xfrm>
-          <a:prstGeom prst="rect">
-            <a:avLst/>
-          </a:prstGeom>
-          <a:noFill/>
-        </p:spPr>
-        <p:txBody>
-          <a:bodyPr wrap="square">
-            <a:spAutoFit/>
-          </a:bodyPr>
-          <a:lstStyle/>
-          <a:p>
-            <a:pPr algn="ctr">
-              <a:defRPr sz="4000">
-                <a:solidFill>
-                  <a:srgbClr val="333333"/>
-                </a:solidFill>
-              </a:defRPr>
-            </a:pPr>
-            <a:r>
-              <a:t>"Then the eyes of both of them were opened, and they realized they were naked; so they sewed fig leaves together and made coverings for themselves."</a:t>
-            </a:r>
-          </a:p>
-        </p:txBody>
-      </p:sp>
-    </p:spTree>
-  </p:cSld>
-  <p:clrMapOvr>
-    <a:masterClrMapping/>
-  </p:clrMapOvr>
-</p:sld>
-</file>
-
-<file path=ppt/slides/slide18.xml><?xml version="1.0" encoding="utf-8"?>
-<p:sld xmlns:a="http://schemas.openxmlformats.org/drawingml/2006/main" xmlns:p="http://schemas.openxmlformats.org/presentationml/2006/main" xmlns:r="http://schemas.openxmlformats.org/officeDocument/2006/relationships">
-  <p:cSld>
-    <p:spTree>
-      <p:nvGrpSpPr>
-        <p:cNvPr id="1" name=""/>
-        <p:cNvGrpSpPr/>
-        <p:nvPr/>
-      </p:nvGrpSpPr>
-      <p:grpSpPr/>
-      <p:sp>
-        <p:nvSpPr>
-          <p:cNvPr id="2" name="Title 1"/>
-          <p:cNvSpPr>
-            <a:spLocks noGrp="1"/>
-          </p:cNvSpPr>
-          <p:nvPr>
-            <p:ph type="title"/>
-          </p:nvPr>
-        </p:nvSpPr>
-        <p:spPr/>
-        <p:txBody>
-          <a:bodyPr/>
-          <a:lstStyle/>
-          <a:p/>
-        </p:txBody>
-      </p:sp>
-      <p:sp>
-        <p:nvSpPr>
-          <p:cNvPr id="3" name="TextBox 2"/>
-          <p:cNvSpPr txBox="1"/>
-          <p:nvPr/>
-        </p:nvSpPr>
-        <p:spPr>
-          <a:xfrm>
-            <a:off x="914400" y="914400"/>
-            <a:ext cx="7315200" cy="914400"/>
-          </a:xfrm>
-          <a:prstGeom prst="rect">
-            <a:avLst/>
-          </a:prstGeom>
-          <a:noFill/>
-        </p:spPr>
-        <p:txBody>
-          <a:bodyPr wrap="none">
-            <a:spAutoFit/>
-          </a:bodyPr>
-          <a:lstStyle/>
-          <a:p>
-            <a:pPr algn="ctr">
-              <a:defRPr sz="2800" b="1">
-                <a:solidFill>
-                  <a:srgbClr val="003366"/>
-                </a:solidFill>
-              </a:defRPr>
-            </a:pPr>
-            <a:r>
-              <a:t>Genesis 3:21</a:t>
-            </a:r>
-          </a:p>
-        </p:txBody>
-      </p:sp>
-      <p:sp>
-        <p:nvSpPr>
-          <p:cNvPr id="4" name="TextBox 3"/>
-          <p:cNvSpPr txBox="1"/>
-          <p:nvPr/>
-        </p:nvSpPr>
-        <p:spPr>
-          <a:xfrm>
-            <a:off x="914400" y="2286000"/>
-            <a:ext cx="7315200" cy="3657600"/>
-          </a:xfrm>
-          <a:prstGeom prst="rect">
-            <a:avLst/>
-          </a:prstGeom>
-          <a:noFill/>
-        </p:spPr>
-        <p:txBody>
-          <a:bodyPr wrap="square">
-            <a:spAutoFit/>
-          </a:bodyPr>
-          <a:lstStyle/>
-          <a:p>
-            <a:pPr algn="ctr">
-              <a:defRPr sz="4000">
-                <a:solidFill>
-                  <a:srgbClr val="333333"/>
-                </a:solidFill>
-              </a:defRPr>
-            </a:pPr>
-            <a:r>
-              <a:t>"The Lord God made garments of skin for Adam and his wife and clothed them."</a:t>
-            </a:r>
-          </a:p>
-        </p:txBody>
-      </p:sp>
-    </p:spTree>
-  </p:cSld>
-  <p:clrMapOvr>
-    <a:masterClrMapping/>
-  </p:clrMapOvr>
-</p:sld>
-</file>
-
-<file path=ppt/slides/slide19.xml><?xml version="1.0" encoding="utf-8"?>
-<p:sld xmlns:a="http://schemas.openxmlformats.org/drawingml/2006/main" xmlns:p="http://schemas.openxmlformats.org/presentationml/2006/main" xmlns:r="http://schemas.openxmlformats.org/officeDocument/2006/relationships">
-  <p:cSld>
-    <p:spTree>
-      <p:nvGrpSpPr>
-        <p:cNvPr id="1" name=""/>
-        <p:cNvGrpSpPr/>
-        <p:nvPr/>
-      </p:nvGrpSpPr>
-      <p:grpSpPr/>
-      <p:sp>
-        <p:nvSpPr>
-          <p:cNvPr id="2" name="Title 1"/>
-          <p:cNvSpPr>
-            <a:spLocks noGrp="1"/>
-          </p:cNvSpPr>
-          <p:nvPr>
-            <p:ph type="title"/>
-          </p:nvPr>
-        </p:nvSpPr>
-        <p:spPr/>
-        <p:txBody>
-          <a:bodyPr/>
-          <a:lstStyle/>
-          <a:p/>
-        </p:txBody>
-      </p:sp>
-      <p:sp>
-        <p:nvSpPr>
-          <p:cNvPr id="3" name="TextBox 2"/>
-          <p:cNvSpPr txBox="1"/>
-          <p:nvPr/>
-        </p:nvSpPr>
-        <p:spPr>
-          <a:xfrm>
-            <a:off x="914400" y="914400"/>
-            <a:ext cx="7315200" cy="914400"/>
-          </a:xfrm>
-          <a:prstGeom prst="rect">
-            <a:avLst/>
-          </a:prstGeom>
-          <a:noFill/>
-        </p:spPr>
-        <p:txBody>
-          <a:bodyPr wrap="none">
-            <a:spAutoFit/>
-          </a:bodyPr>
-          <a:lstStyle/>
-          <a:p>
-            <a:pPr algn="ctr">
-              <a:defRPr sz="2800" b="1">
-                <a:solidFill>
-                  <a:srgbClr val="003366"/>
-                </a:solidFill>
-              </a:defRPr>
-            </a:pPr>
-            <a:r>
-              <a:t>Genesis 4:3-4 (Part 1/2)</a:t>
-            </a:r>
-          </a:p>
-        </p:txBody>
-      </p:sp>
-      <p:sp>
-        <p:nvSpPr>
-          <p:cNvPr id="4" name="TextBox 3"/>
-          <p:cNvSpPr txBox="1"/>
-          <p:nvPr/>
-        </p:nvSpPr>
-        <p:spPr>
-          <a:xfrm>
-            <a:off x="914400" y="2286000"/>
-            <a:ext cx="7315200" cy="3657600"/>
-          </a:xfrm>
-          <a:prstGeom prst="rect">
-            <a:avLst/>
-          </a:prstGeom>
-          <a:noFill/>
-        </p:spPr>
-        <p:txBody>
-          <a:bodyPr wrap="square">
-            <a:spAutoFit/>
-          </a:bodyPr>
-          <a:lstStyle/>
-          <a:p>
-            <a:pPr algn="ctr">
-              <a:defRPr sz="4000">
-                <a:solidFill>
-                  <a:srgbClr val="333333"/>
-                </a:solidFill>
-              </a:defRPr>
-            </a:pPr>
-            <a:r>
-              <a:t>"In the course of time Cain brought some of the fruits of the soil as an offering to the Lord.And Abel also brought an offering—fat portions from some of the firstborn of his flock."</a:t>
+              <a:t>"Christ is become of no effect unto you, whosoever of you are justified by the law; ye are fallen from grace."</a:t>
             </a:r>
           </a:p>
         </p:txBody>
@@ -4275,7 +3739,7 @@
 </p:sld>
 </file>
 
-<file path=ppt/slides/slide20.xml><?xml version="1.0" encoding="utf-8"?>
+<file path=ppt/slides/slide3.xml><?xml version="1.0" encoding="utf-8"?>
 <p:sld xmlns:a="http://schemas.openxmlformats.org/drawingml/2006/main" xmlns:p="http://schemas.openxmlformats.org/presentationml/2006/main" xmlns:r="http://schemas.openxmlformats.org/officeDocument/2006/relationships">
   <p:cSld>
     <p:spTree>
@@ -4332,7 +3796,7 @@
               </a:defRPr>
             </a:pPr>
             <a:r>
-              <a:t>Genesis 4:3-4 (Part 2/2)</a:t>
+              <a:t>Genesis 12:2 (KJV)</a:t>
             </a:r>
           </a:p>
         </p:txBody>
@@ -4367,637 +3831,7 @@
               </a:defRPr>
             </a:pPr>
             <a:r>
-              <a:t>"The Lord looked with favor on Abel and his offering,"</a:t>
-            </a:r>
-          </a:p>
-        </p:txBody>
-      </p:sp>
-    </p:spTree>
-  </p:cSld>
-  <p:clrMapOvr>
-    <a:masterClrMapping/>
-  </p:clrMapOvr>
-</p:sld>
-</file>
-
-<file path=ppt/slides/slide21.xml><?xml version="1.0" encoding="utf-8"?>
-<p:sld xmlns:a="http://schemas.openxmlformats.org/drawingml/2006/main" xmlns:p="http://schemas.openxmlformats.org/presentationml/2006/main" xmlns:r="http://schemas.openxmlformats.org/officeDocument/2006/relationships">
-  <p:cSld>
-    <p:spTree>
-      <p:nvGrpSpPr>
-        <p:cNvPr id="1" name=""/>
-        <p:cNvGrpSpPr/>
-        <p:nvPr/>
-      </p:nvGrpSpPr>
-      <p:grpSpPr/>
-      <p:sp>
-        <p:nvSpPr>
-          <p:cNvPr id="2" name="Title 1"/>
-          <p:cNvSpPr>
-            <a:spLocks noGrp="1"/>
-          </p:cNvSpPr>
-          <p:nvPr>
-            <p:ph type="title"/>
-          </p:nvPr>
-        </p:nvSpPr>
-        <p:spPr/>
-        <p:txBody>
-          <a:bodyPr/>
-          <a:lstStyle/>
-          <a:p/>
-        </p:txBody>
-      </p:sp>
-      <p:sp>
-        <p:nvSpPr>
-          <p:cNvPr id="3" name="TextBox 2"/>
-          <p:cNvSpPr txBox="1"/>
-          <p:nvPr/>
-        </p:nvSpPr>
-        <p:spPr>
-          <a:xfrm>
-            <a:off x="914400" y="914400"/>
-            <a:ext cx="7315200" cy="914400"/>
-          </a:xfrm>
-          <a:prstGeom prst="rect">
-            <a:avLst/>
-          </a:prstGeom>
-          <a:noFill/>
-        </p:spPr>
-        <p:txBody>
-          <a:bodyPr wrap="none">
-            <a:spAutoFit/>
-          </a:bodyPr>
-          <a:lstStyle/>
-          <a:p>
-            <a:pPr algn="ctr">
-              <a:defRPr sz="2800" b="1">
-                <a:solidFill>
-                  <a:srgbClr val="003366"/>
-                </a:solidFill>
-              </a:defRPr>
-            </a:pPr>
-            <a:r>
-              <a:t>Jeremiah 23:4</a:t>
-            </a:r>
-          </a:p>
-        </p:txBody>
-      </p:sp>
-      <p:sp>
-        <p:nvSpPr>
-          <p:cNvPr id="4" name="TextBox 3"/>
-          <p:cNvSpPr txBox="1"/>
-          <p:nvPr/>
-        </p:nvSpPr>
-        <p:spPr>
-          <a:xfrm>
-            <a:off x="914400" y="2286000"/>
-            <a:ext cx="7315200" cy="3657600"/>
-          </a:xfrm>
-          <a:prstGeom prst="rect">
-            <a:avLst/>
-          </a:prstGeom>
-          <a:noFill/>
-        </p:spPr>
-        <p:txBody>
-          <a:bodyPr wrap="square">
-            <a:spAutoFit/>
-          </a:bodyPr>
-          <a:lstStyle/>
-          <a:p>
-            <a:pPr algn="ctr">
-              <a:defRPr sz="4000">
-                <a:solidFill>
-                  <a:srgbClr val="333333"/>
-                </a:solidFill>
-              </a:defRPr>
-            </a:pPr>
-            <a:r>
-              <a:t>"I will place shepherds over them who will tend them, and they will no longer be afraid or terrified, nor will any be missing," declares the Lord."</a:t>
-            </a:r>
-          </a:p>
-        </p:txBody>
-      </p:sp>
-    </p:spTree>
-  </p:cSld>
-  <p:clrMapOvr>
-    <a:masterClrMapping/>
-  </p:clrMapOvr>
-</p:sld>
-</file>
-
-<file path=ppt/slides/slide22.xml><?xml version="1.0" encoding="utf-8"?>
-<p:sld xmlns:a="http://schemas.openxmlformats.org/drawingml/2006/main" xmlns:p="http://schemas.openxmlformats.org/presentationml/2006/main" xmlns:r="http://schemas.openxmlformats.org/officeDocument/2006/relationships">
-  <p:cSld>
-    <p:spTree>
-      <p:nvGrpSpPr>
-        <p:cNvPr id="1" name=""/>
-        <p:cNvGrpSpPr/>
-        <p:nvPr/>
-      </p:nvGrpSpPr>
-      <p:grpSpPr/>
-      <p:sp>
-        <p:nvSpPr>
-          <p:cNvPr id="2" name="Title 1"/>
-          <p:cNvSpPr>
-            <a:spLocks noGrp="1"/>
-          </p:cNvSpPr>
-          <p:nvPr>
-            <p:ph type="title"/>
-          </p:nvPr>
-        </p:nvSpPr>
-        <p:spPr/>
-        <p:txBody>
-          <a:bodyPr/>
-          <a:lstStyle/>
-          <a:p/>
-        </p:txBody>
-      </p:sp>
-      <p:sp>
-        <p:nvSpPr>
-          <p:cNvPr id="3" name="TextBox 2"/>
-          <p:cNvSpPr txBox="1"/>
-          <p:nvPr/>
-        </p:nvSpPr>
-        <p:spPr>
-          <a:xfrm>
-            <a:off x="914400" y="914400"/>
-            <a:ext cx="7315200" cy="914400"/>
-          </a:xfrm>
-          <a:prstGeom prst="rect">
-            <a:avLst/>
-          </a:prstGeom>
-          <a:noFill/>
-        </p:spPr>
-        <p:txBody>
-          <a:bodyPr wrap="none">
-            <a:spAutoFit/>
-          </a:bodyPr>
-          <a:lstStyle/>
-          <a:p>
-            <a:pPr algn="ctr">
-              <a:defRPr sz="2800" b="1">
-                <a:solidFill>
-                  <a:srgbClr val="003366"/>
-                </a:solidFill>
-              </a:defRPr>
-            </a:pPr>
-            <a:r>
-              <a:t>Jeremiah 23:6</a:t>
-            </a:r>
-          </a:p>
-        </p:txBody>
-      </p:sp>
-      <p:sp>
-        <p:nvSpPr>
-          <p:cNvPr id="4" name="TextBox 3"/>
-          <p:cNvSpPr txBox="1"/>
-          <p:nvPr/>
-        </p:nvSpPr>
-        <p:spPr>
-          <a:xfrm>
-            <a:off x="914400" y="2286000"/>
-            <a:ext cx="7315200" cy="3657600"/>
-          </a:xfrm>
-          <a:prstGeom prst="rect">
-            <a:avLst/>
-          </a:prstGeom>
-          <a:noFill/>
-        </p:spPr>
-        <p:txBody>
-          <a:bodyPr wrap="square">
-            <a:spAutoFit/>
-          </a:bodyPr>
-          <a:lstStyle/>
-          <a:p>
-            <a:pPr algn="ctr">
-              <a:defRPr sz="4000">
-                <a:solidFill>
-                  <a:srgbClr val="333333"/>
-                </a:solidFill>
-              </a:defRPr>
-            </a:pPr>
-            <a:r>
-              <a:t>"In his days Judah will be saved and Israel will live in safety. This is the name by which he will be called: The Lord Our Righteous Savior."</a:t>
-            </a:r>
-          </a:p>
-        </p:txBody>
-      </p:sp>
-    </p:spTree>
-  </p:cSld>
-  <p:clrMapOvr>
-    <a:masterClrMapping/>
-  </p:clrMapOvr>
-</p:sld>
-</file>
-
-<file path=ppt/slides/slide23.xml><?xml version="1.0" encoding="utf-8"?>
-<p:sld xmlns:a="http://schemas.openxmlformats.org/drawingml/2006/main" xmlns:p="http://schemas.openxmlformats.org/presentationml/2006/main" xmlns:r="http://schemas.openxmlformats.org/officeDocument/2006/relationships">
-  <p:cSld>
-    <p:spTree>
-      <p:nvGrpSpPr>
-        <p:cNvPr id="1" name=""/>
-        <p:cNvGrpSpPr/>
-        <p:nvPr/>
-      </p:nvGrpSpPr>
-      <p:grpSpPr/>
-      <p:sp>
-        <p:nvSpPr>
-          <p:cNvPr id="2" name="Title 1"/>
-          <p:cNvSpPr>
-            <a:spLocks noGrp="1"/>
-          </p:cNvSpPr>
-          <p:nvPr>
-            <p:ph type="title"/>
-          </p:nvPr>
-        </p:nvSpPr>
-        <p:spPr/>
-        <p:txBody>
-          <a:bodyPr/>
-          <a:lstStyle/>
-          <a:p/>
-        </p:txBody>
-      </p:sp>
-      <p:sp>
-        <p:nvSpPr>
-          <p:cNvPr id="3" name="TextBox 2"/>
-          <p:cNvSpPr txBox="1"/>
-          <p:nvPr/>
-        </p:nvSpPr>
-        <p:spPr>
-          <a:xfrm>
-            <a:off x="914400" y="914400"/>
-            <a:ext cx="7315200" cy="914400"/>
-          </a:xfrm>
-          <a:prstGeom prst="rect">
-            <a:avLst/>
-          </a:prstGeom>
-          <a:noFill/>
-        </p:spPr>
-        <p:txBody>
-          <a:bodyPr wrap="none">
-            <a:spAutoFit/>
-          </a:bodyPr>
-          <a:lstStyle/>
-          <a:p>
-            <a:pPr algn="ctr">
-              <a:defRPr sz="2800" b="1">
-                <a:solidFill>
-                  <a:srgbClr val="003366"/>
-                </a:solidFill>
-              </a:defRPr>
-            </a:pPr>
-            <a:r>
-              <a:t>Jeremiah 33:16</a:t>
-            </a:r>
-          </a:p>
-        </p:txBody>
-      </p:sp>
-      <p:sp>
-        <p:nvSpPr>
-          <p:cNvPr id="4" name="TextBox 3"/>
-          <p:cNvSpPr txBox="1"/>
-          <p:nvPr/>
-        </p:nvSpPr>
-        <p:spPr>
-          <a:xfrm>
-            <a:off x="914400" y="2286000"/>
-            <a:ext cx="7315200" cy="3657600"/>
-          </a:xfrm>
-          <a:prstGeom prst="rect">
-            <a:avLst/>
-          </a:prstGeom>
-          <a:noFill/>
-        </p:spPr>
-        <p:txBody>
-          <a:bodyPr wrap="square">
-            <a:spAutoFit/>
-          </a:bodyPr>
-          <a:lstStyle/>
-          <a:p>
-            <a:pPr algn="ctr">
-              <a:defRPr sz="4000">
-                <a:solidFill>
-                  <a:srgbClr val="333333"/>
-                </a:solidFill>
-              </a:defRPr>
-            </a:pPr>
-            <a:r>
-              <a:t>"In those days Judah will be saved and Jerusalem will live in safety. This is the name by which it will be called: The Lord Our Righteous Savior.'"</a:t>
-            </a:r>
-          </a:p>
-        </p:txBody>
-      </p:sp>
-    </p:spTree>
-  </p:cSld>
-  <p:clrMapOvr>
-    <a:masterClrMapping/>
-  </p:clrMapOvr>
-</p:sld>
-</file>
-
-<file path=ppt/slides/slide24.xml><?xml version="1.0" encoding="utf-8"?>
-<p:sld xmlns:a="http://schemas.openxmlformats.org/drawingml/2006/main" xmlns:p="http://schemas.openxmlformats.org/presentationml/2006/main" xmlns:r="http://schemas.openxmlformats.org/officeDocument/2006/relationships">
-  <p:cSld>
-    <p:spTree>
-      <p:nvGrpSpPr>
-        <p:cNvPr id="1" name=""/>
-        <p:cNvGrpSpPr/>
-        <p:nvPr/>
-      </p:nvGrpSpPr>
-      <p:grpSpPr/>
-      <p:sp>
-        <p:nvSpPr>
-          <p:cNvPr id="2" name="Title 1"/>
-          <p:cNvSpPr>
-            <a:spLocks noGrp="1"/>
-          </p:cNvSpPr>
-          <p:nvPr>
-            <p:ph type="title"/>
-          </p:nvPr>
-        </p:nvSpPr>
-        <p:spPr/>
-        <p:txBody>
-          <a:bodyPr/>
-          <a:lstStyle/>
-          <a:p/>
-        </p:txBody>
-      </p:sp>
-      <p:sp>
-        <p:nvSpPr>
-          <p:cNvPr id="3" name="TextBox 2"/>
-          <p:cNvSpPr txBox="1"/>
-          <p:nvPr/>
-        </p:nvSpPr>
-        <p:spPr>
-          <a:xfrm>
-            <a:off x="914400" y="914400"/>
-            <a:ext cx="7315200" cy="914400"/>
-          </a:xfrm>
-          <a:prstGeom prst="rect">
-            <a:avLst/>
-          </a:prstGeom>
-          <a:noFill/>
-        </p:spPr>
-        <p:txBody>
-          <a:bodyPr wrap="none">
-            <a:spAutoFit/>
-          </a:bodyPr>
-          <a:lstStyle/>
-          <a:p>
-            <a:pPr algn="ctr">
-              <a:defRPr sz="2800" b="1">
-                <a:solidFill>
-                  <a:srgbClr val="003366"/>
-                </a:solidFill>
-              </a:defRPr>
-            </a:pPr>
-            <a:r>
-              <a:t>Matthew 6:31</a:t>
-            </a:r>
-          </a:p>
-        </p:txBody>
-      </p:sp>
-      <p:sp>
-        <p:nvSpPr>
-          <p:cNvPr id="4" name="TextBox 3"/>
-          <p:cNvSpPr txBox="1"/>
-          <p:nvPr/>
-        </p:nvSpPr>
-        <p:spPr>
-          <a:xfrm>
-            <a:off x="914400" y="2286000"/>
-            <a:ext cx="7315200" cy="3657600"/>
-          </a:xfrm>
-          <a:prstGeom prst="rect">
-            <a:avLst/>
-          </a:prstGeom>
-          <a:noFill/>
-        </p:spPr>
-        <p:txBody>
-          <a:bodyPr wrap="square">
-            <a:spAutoFit/>
-          </a:bodyPr>
-          <a:lstStyle/>
-          <a:p>
-            <a:pPr algn="ctr">
-              <a:defRPr sz="4000">
-                <a:solidFill>
-                  <a:srgbClr val="333333"/>
-                </a:solidFill>
-              </a:defRPr>
-            </a:pPr>
-            <a:r>
-              <a:t>"So do not worry, saying, 'What shall we eat?' or 'What shall we drink?' or 'What shall we wear?'"</a:t>
-            </a:r>
-          </a:p>
-        </p:txBody>
-      </p:sp>
-    </p:spTree>
-  </p:cSld>
-  <p:clrMapOvr>
-    <a:masterClrMapping/>
-  </p:clrMapOvr>
-</p:sld>
-</file>
-
-<file path=ppt/slides/slide25.xml><?xml version="1.0" encoding="utf-8"?>
-<p:sld xmlns:a="http://schemas.openxmlformats.org/drawingml/2006/main" xmlns:p="http://schemas.openxmlformats.org/presentationml/2006/main" xmlns:r="http://schemas.openxmlformats.org/officeDocument/2006/relationships">
-  <p:cSld>
-    <p:spTree>
-      <p:nvGrpSpPr>
-        <p:cNvPr id="1" name=""/>
-        <p:cNvGrpSpPr/>
-        <p:nvPr/>
-      </p:nvGrpSpPr>
-      <p:grpSpPr/>
-      <p:sp>
-        <p:nvSpPr>
-          <p:cNvPr id="2" name="Title 1"/>
-          <p:cNvSpPr>
-            <a:spLocks noGrp="1"/>
-          </p:cNvSpPr>
-          <p:nvPr>
-            <p:ph type="title"/>
-          </p:nvPr>
-        </p:nvSpPr>
-        <p:spPr/>
-        <p:txBody>
-          <a:bodyPr/>
-          <a:lstStyle/>
-          <a:p/>
-        </p:txBody>
-      </p:sp>
-      <p:sp>
-        <p:nvSpPr>
-          <p:cNvPr id="3" name="TextBox 2"/>
-          <p:cNvSpPr txBox="1"/>
-          <p:nvPr/>
-        </p:nvSpPr>
-        <p:spPr>
-          <a:xfrm>
-            <a:off x="914400" y="914400"/>
-            <a:ext cx="7315200" cy="914400"/>
-          </a:xfrm>
-          <a:prstGeom prst="rect">
-            <a:avLst/>
-          </a:prstGeom>
-          <a:noFill/>
-        </p:spPr>
-        <p:txBody>
-          <a:bodyPr wrap="none">
-            <a:spAutoFit/>
-          </a:bodyPr>
-          <a:lstStyle/>
-          <a:p>
-            <a:pPr algn="ctr">
-              <a:defRPr sz="2800" b="1">
-                <a:solidFill>
-                  <a:srgbClr val="003366"/>
-                </a:solidFill>
-              </a:defRPr>
-            </a:pPr>
-            <a:r>
-              <a:t>Matthew 6:33</a:t>
-            </a:r>
-          </a:p>
-        </p:txBody>
-      </p:sp>
-      <p:sp>
-        <p:nvSpPr>
-          <p:cNvPr id="4" name="TextBox 3"/>
-          <p:cNvSpPr txBox="1"/>
-          <p:nvPr/>
-        </p:nvSpPr>
-        <p:spPr>
-          <a:xfrm>
-            <a:off x="914400" y="2286000"/>
-            <a:ext cx="7315200" cy="3657600"/>
-          </a:xfrm>
-          <a:prstGeom prst="rect">
-            <a:avLst/>
-          </a:prstGeom>
-          <a:noFill/>
-        </p:spPr>
-        <p:txBody>
-          <a:bodyPr wrap="square">
-            <a:spAutoFit/>
-          </a:bodyPr>
-          <a:lstStyle/>
-          <a:p>
-            <a:pPr algn="ctr">
-              <a:defRPr sz="4000">
-                <a:solidFill>
-                  <a:srgbClr val="333333"/>
-                </a:solidFill>
-              </a:defRPr>
-            </a:pPr>
-            <a:r>
-              <a:t>"But seek first his kingdom and his righteousness, and all these things will be given to you as well."</a:t>
-            </a:r>
-          </a:p>
-        </p:txBody>
-      </p:sp>
-    </p:spTree>
-  </p:cSld>
-  <p:clrMapOvr>
-    <a:masterClrMapping/>
-  </p:clrMapOvr>
-</p:sld>
-</file>
-
-<file path=ppt/slides/slide3.xml><?xml version="1.0" encoding="utf-8"?>
-<p:sld xmlns:a="http://schemas.openxmlformats.org/drawingml/2006/main" xmlns:p="http://schemas.openxmlformats.org/presentationml/2006/main" xmlns:r="http://schemas.openxmlformats.org/officeDocument/2006/relationships">
-  <p:cSld>
-    <p:spTree>
-      <p:nvGrpSpPr>
-        <p:cNvPr id="1" name=""/>
-        <p:cNvGrpSpPr/>
-        <p:nvPr/>
-      </p:nvGrpSpPr>
-      <p:grpSpPr/>
-      <p:sp>
-        <p:nvSpPr>
-          <p:cNvPr id="2" name="Title 1"/>
-          <p:cNvSpPr>
-            <a:spLocks noGrp="1"/>
-          </p:cNvSpPr>
-          <p:nvPr>
-            <p:ph type="title"/>
-          </p:nvPr>
-        </p:nvSpPr>
-        <p:spPr/>
-        <p:txBody>
-          <a:bodyPr/>
-          <a:lstStyle/>
-          <a:p/>
-        </p:txBody>
-      </p:sp>
-      <p:sp>
-        <p:nvSpPr>
-          <p:cNvPr id="3" name="TextBox 2"/>
-          <p:cNvSpPr txBox="1"/>
-          <p:nvPr/>
-        </p:nvSpPr>
-        <p:spPr>
-          <a:xfrm>
-            <a:off x="914400" y="914400"/>
-            <a:ext cx="7315200" cy="914400"/>
-          </a:xfrm>
-          <a:prstGeom prst="rect">
-            <a:avLst/>
-          </a:prstGeom>
-          <a:noFill/>
-        </p:spPr>
-        <p:txBody>
-          <a:bodyPr wrap="none">
-            <a:spAutoFit/>
-          </a:bodyPr>
-          <a:lstStyle/>
-          <a:p>
-            <a:pPr algn="ctr">
-              <a:defRPr sz="2800" b="1">
-                <a:solidFill>
-                  <a:srgbClr val="003366"/>
-                </a:solidFill>
-              </a:defRPr>
-            </a:pPr>
-            <a:r>
-              <a:t>Psalm 71:2</a:t>
-            </a:r>
-          </a:p>
-        </p:txBody>
-      </p:sp>
-      <p:sp>
-        <p:nvSpPr>
-          <p:cNvPr id="4" name="TextBox 3"/>
-          <p:cNvSpPr txBox="1"/>
-          <p:nvPr/>
-        </p:nvSpPr>
-        <p:spPr>
-          <a:xfrm>
-            <a:off x="914400" y="2286000"/>
-            <a:ext cx="7315200" cy="3657600"/>
-          </a:xfrm>
-          <a:prstGeom prst="rect">
-            <a:avLst/>
-          </a:prstGeom>
-          <a:noFill/>
-        </p:spPr>
-        <p:txBody>
-          <a:bodyPr wrap="square">
-            <a:spAutoFit/>
-          </a:bodyPr>
-          <a:lstStyle/>
-          <a:p>
-            <a:pPr algn="ctr">
-              <a:defRPr sz="4000">
-                <a:solidFill>
-                  <a:srgbClr val="333333"/>
-                </a:solidFill>
-              </a:defRPr>
-            </a:pPr>
-            <a:r>
-              <a:t>"In your righteousness, rescue me and deliver me; turn your ear to me and save me."</a:t>
+              <a:t>"And I will make of thee a great nation, and I will bless thee, and make thy name great; and thou shalt be a blessing."</a:t>
             </a:r>
           </a:p>
         </p:txBody>
@@ -5067,7 +3901,7 @@
               </a:defRPr>
             </a:pPr>
             <a:r>
-              <a:t>Psalm 71:15</a:t>
+              <a:t>2 Corinthians 5:17 (KJV)</a:t>
             </a:r>
           </a:p>
         </p:txBody>
@@ -5102,7 +3936,7 @@
               </a:defRPr>
             </a:pPr>
             <a:r>
-              <a:t>"My mouth will tell of your righteous deeds, of your saving acts all day long—though I know not how to relate them all."</a:t>
+              <a:t>"Therefore if any man be in Christ, he is a new creature: old things are passed away; behold, all things are become new."</a:t>
             </a:r>
           </a:p>
         </p:txBody>
@@ -5172,7 +4006,7 @@
               </a:defRPr>
             </a:pPr>
             <a:r>
-              <a:t>Psalm 71:16</a:t>
+              <a:t>Revelation 21:4 (KJV)</a:t>
             </a:r>
           </a:p>
         </p:txBody>
@@ -5207,7 +4041,7 @@
               </a:defRPr>
             </a:pPr>
             <a:r>
-              <a:t>"I will come and proclaim your mighty acts, Sovereign Lord; I will proclaim your righteous deeds, yours alone."</a:t>
+              <a:t>"And God shall wipe away all tears from their eyes; and there shall be no more death, neither sorrow, nor crying, neither shall there be any more pain: for the former things are passed away."</a:t>
             </a:r>
           </a:p>
         </p:txBody>
@@ -5277,7 +4111,7 @@
               </a:defRPr>
             </a:pPr>
             <a:r>
-              <a:t>Psalm 71:19</a:t>
+              <a:t>Genesis 17:1 (KJV)</a:t>
             </a:r>
           </a:p>
         </p:txBody>
@@ -5312,7 +4146,7 @@
               </a:defRPr>
             </a:pPr>
             <a:r>
-              <a:t>"Your righteousness, God, reaches to the heavens, you who have done great things. Who is like you, God?"</a:t>
+              <a:t>"And when Abram was ninety years old and nine, the Lord appeared to Abram, and said unto him, I am the Almighty God; walk before me, and be thou perfect."</a:t>
             </a:r>
           </a:p>
         </p:txBody>
@@ -5382,7 +4216,7 @@
               </a:defRPr>
             </a:pPr>
             <a:r>
-              <a:t>Psalm 71:24</a:t>
+              <a:t>Genesis 17:5 (KJV)</a:t>
             </a:r>
           </a:p>
         </p:txBody>
@@ -5417,7 +4251,7 @@
               </a:defRPr>
             </a:pPr>
             <a:r>
-              <a:t>"My tongue will tell of your righteous acts all day long, for those who wanted to harm me have been put to shame and confusion."</a:t>
+              <a:t>"Neither shall thy name any more be called Abram, but thy name shall be Abraham; for a father of many nations have I made thee."</a:t>
             </a:r>
           </a:p>
         </p:txBody>
@@ -5487,7 +4321,7 @@
               </a:defRPr>
             </a:pPr>
             <a:r>
-              <a:t>Proverbs 22:3</a:t>
+              <a:t>Genesis 17:15 (KJV)</a:t>
             </a:r>
           </a:p>
         </p:txBody>
@@ -5522,7 +4356,7 @@
               </a:defRPr>
             </a:pPr>
             <a:r>
-              <a:t>"The prudent see danger and take refuge, but the simple keep going and pay the penalty."</a:t>
+              <a:t>"And God said unto Abraham, As for Sarai thy wife, thou shalt not call her name Sarai, but Sarah shall her name be."</a:t>
             </a:r>
           </a:p>
         </p:txBody>
@@ -5592,7 +4426,7 @@
               </a:defRPr>
             </a:pPr>
             <a:r>
-              <a:t>Psalm 119:71</a:t>
+              <a:t>Romans 4:13–14 (KJV) (Part 1/2)</a:t>
             </a:r>
           </a:p>
         </p:txBody>
@@ -5627,7 +4461,7 @@
               </a:defRPr>
             </a:pPr>
             <a:r>
-              <a:t>"It was good for me to be afflicted so that I might learn your decrees."</a:t>
+              <a:t>"For the promise, that he should be the heir of the world, was not to Abraham, or to his seed, through the law, but through the righteousness of faith."</a:t>
             </a:r>
           </a:p>
         </p:txBody>

</xml_diff>